<commit_message>
adding new schema and hide optimization loop slide
</commit_message>
<xml_diff>
--- a/presentation_data_challenge.pptx
+++ b/presentation_data_challenge.pptx
@@ -1,14 +1,14 @@
 
 <file path=ppt/presentation.xml><?xml version="1.0" encoding="utf-8"?>
-<p:presentation xmlns:a="http://schemas.openxmlformats.org/drawingml/2006/main" xmlns:r="http://schemas.openxmlformats.org/officeDocument/2006/relationships" xmlns:p="http://schemas.openxmlformats.org/presentationml/2006/main" removePersonalInfoOnSave="1" saveSubsetFonts="1">
+<p:presentation xmlns:a="http://schemas.openxmlformats.org/drawingml/2006/main" xmlns:r="http://schemas.openxmlformats.org/officeDocument/2006/relationships" xmlns:p="http://schemas.openxmlformats.org/presentationml/2006/main" showSpecialPlsOnTitleSld="0" removePersonalInfoOnSave="1" saveSubsetFonts="1">
   <p:sldMasterIdLst>
     <p:sldMasterId id="2147483648" r:id="rId1"/>
   </p:sldMasterIdLst>
   <p:notesMasterIdLst>
-    <p:notesMasterId r:id="rId16"/>
+    <p:notesMasterId r:id="rId17"/>
   </p:notesMasterIdLst>
   <p:handoutMasterIdLst>
-    <p:handoutMasterId r:id="rId17"/>
+    <p:handoutMasterId r:id="rId18"/>
   </p:handoutMasterIdLst>
   <p:sldIdLst>
     <p:sldId id="256" r:id="rId2"/>
@@ -22,9 +22,10 @@
     <p:sldId id="295" r:id="rId10"/>
     <p:sldId id="296" r:id="rId11"/>
     <p:sldId id="297" r:id="rId12"/>
-    <p:sldId id="298" r:id="rId13"/>
-    <p:sldId id="299" r:id="rId14"/>
-    <p:sldId id="285" r:id="rId15"/>
+    <p:sldId id="300" r:id="rId13"/>
+    <p:sldId id="298" r:id="rId14"/>
+    <p:sldId id="299" r:id="rId15"/>
+    <p:sldId id="285" r:id="rId16"/>
   </p:sldIdLst>
   <p:sldSz cx="12192000" cy="6858000"/>
   <p:notesSz cx="6858000" cy="9144000"/>
@@ -3264,7 +3265,7 @@
             <a:pPr rtl="0"/>
             <a:fld id="{D6FB0DE1-D418-4EA9-BDFD-2E5632763663}" type="datetime1">
               <a:rPr lang="fr-FR" smtClean="0"/>
-              <a:t>23/01/2020</a:t>
+              <a:t>24/01/2020</a:t>
             </a:fld>
             <a:endParaRPr lang="en-US"/>
           </a:p>
@@ -3446,7 +3447,7 @@
             <a:pPr rtl="0"/>
             <a:fld id="{190BD304-4DB2-4DA8-BE69-274C9984CC7A}" type="datetime1">
               <a:rPr lang="fr-FR" smtClean="0"/>
-              <a:t>23/01/2020</a:t>
+              <a:t>24/01/2020</a:t>
             </a:fld>
             <a:endParaRPr lang="en-US" dirty="0"/>
           </a:p>
@@ -4051,7 +4052,7 @@
     </p:spTree>
     <p:extLst>
       <p:ext uri="{BB962C8B-B14F-4D97-AF65-F5344CB8AC3E}">
-        <p14:creationId xmlns:p14="http://schemas.microsoft.com/office/powerpoint/2010/main" val="2705008187"/>
+        <p14:creationId xmlns:p14="http://schemas.microsoft.com/office/powerpoint/2010/main" val="3095123208"/>
       </p:ext>
     </p:extLst>
   </p:cSld>
@@ -4137,7 +4138,7 @@
     </p:spTree>
     <p:extLst>
       <p:ext uri="{BB962C8B-B14F-4D97-AF65-F5344CB8AC3E}">
-        <p14:creationId xmlns:p14="http://schemas.microsoft.com/office/powerpoint/2010/main" val="3413235656"/>
+        <p14:creationId xmlns:p14="http://schemas.microsoft.com/office/powerpoint/2010/main" val="2705008187"/>
       </p:ext>
     </p:extLst>
   </p:cSld>
@@ -4215,6 +4216,92 @@
             <a:fld id="{BE60DC36-8EFA-4378-9855-E019C55AC472}" type="slidenum">
               <a:rPr lang="fr-FR" smtClean="0"/>
               <a:t>14</a:t>
+            </a:fld>
+            <a:endParaRPr lang="fr-FR" dirty="0"/>
+          </a:p>
+        </p:txBody>
+      </p:sp>
+    </p:spTree>
+    <p:extLst>
+      <p:ext uri="{BB962C8B-B14F-4D97-AF65-F5344CB8AC3E}">
+        <p14:creationId xmlns:p14="http://schemas.microsoft.com/office/powerpoint/2010/main" val="3413235656"/>
+      </p:ext>
+    </p:extLst>
+  </p:cSld>
+  <p:clrMapOvr>
+    <a:masterClrMapping/>
+  </p:clrMapOvr>
+</p:notes>
+</file>
+
+<file path=ppt/notesSlides/notesSlide15.xml><?xml version="1.0" encoding="utf-8"?>
+<p:notes xmlns:a="http://schemas.openxmlformats.org/drawingml/2006/main" xmlns:r="http://schemas.openxmlformats.org/officeDocument/2006/relationships" xmlns:p="http://schemas.openxmlformats.org/presentationml/2006/main">
+  <p:cSld>
+    <p:spTree>
+      <p:nvGrpSpPr>
+        <p:cNvPr id="1" name=""/>
+        <p:cNvGrpSpPr/>
+        <p:nvPr/>
+      </p:nvGrpSpPr>
+      <p:grpSpPr>
+        <a:xfrm>
+          <a:off x="0" y="0"/>
+          <a:ext cx="0" cy="0"/>
+          <a:chOff x="0" y="0"/>
+          <a:chExt cx="0" cy="0"/>
+        </a:xfrm>
+      </p:grpSpPr>
+      <p:sp>
+        <p:nvSpPr>
+          <p:cNvPr id="2" name="Espace réservé de l’image des diapositives 1"/>
+          <p:cNvSpPr>
+            <a:spLocks noGrp="1" noRot="1" noChangeAspect="1"/>
+          </p:cNvSpPr>
+          <p:nvPr>
+            <p:ph type="sldImg"/>
+          </p:nvPr>
+        </p:nvSpPr>
+        <p:spPr/>
+      </p:sp>
+      <p:sp>
+        <p:nvSpPr>
+          <p:cNvPr id="3" name="Espace réservé des commentaires 2"/>
+          <p:cNvSpPr>
+            <a:spLocks noGrp="1"/>
+          </p:cNvSpPr>
+          <p:nvPr>
+            <p:ph type="body" idx="1"/>
+          </p:nvPr>
+        </p:nvSpPr>
+        <p:spPr/>
+        <p:txBody>
+          <a:bodyPr rtlCol="0"/>
+          <a:lstStyle/>
+          <a:p>
+            <a:pPr rtl="0"/>
+            <a:endParaRPr lang="fr-FR" dirty="0"/>
+          </a:p>
+        </p:txBody>
+      </p:sp>
+      <p:sp>
+        <p:nvSpPr>
+          <p:cNvPr id="4" name="Espace réservé du numéro de diapositive 3"/>
+          <p:cNvSpPr>
+            <a:spLocks noGrp="1"/>
+          </p:cNvSpPr>
+          <p:nvPr>
+            <p:ph type="sldNum" sz="quarter" idx="5"/>
+          </p:nvPr>
+        </p:nvSpPr>
+        <p:spPr/>
+        <p:txBody>
+          <a:bodyPr rtlCol="0"/>
+          <a:lstStyle/>
+          <a:p>
+            <a:pPr rtl="0"/>
+            <a:fld id="{BE60DC36-8EFA-4378-9855-E019C55AC472}" type="slidenum">
+              <a:rPr lang="fr-FR" smtClean="0"/>
+              <a:t>15</a:t>
             </a:fld>
             <a:endParaRPr lang="fr-FR" dirty="0"/>
           </a:p>
@@ -5071,9 +5158,9 @@
           <a:lstStyle/>
           <a:p>
             <a:pPr rtl="0"/>
-            <a:fld id="{1CD63498-AA6B-4FA3-8C0C-F047B32E6A28}" type="datetime1">
+            <a:fld id="{F61D5321-D7B7-4B81-8FC0-970B004497CE}" type="datetime1">
               <a:rPr lang="fr-FR" noProof="0" smtClean="0"/>
-              <a:t>23/01/2020</a:t>
+              <a:t>24/01/2020</a:t>
             </a:fld>
             <a:endParaRPr lang="fr-FR" noProof="0" dirty="0"/>
           </a:p>
@@ -5101,6 +5188,10 @@
           <a:lstStyle/>
           <a:p>
             <a:pPr rtl="0"/>
+            <a:r>
+              <a:rPr lang="fr-FR" noProof="0"/>
+              <a:t>Data challenge – Bankable customers</a:t>
+            </a:r>
             <a:endParaRPr lang="fr-FR" noProof="0" dirty="0"/>
           </a:p>
         </p:txBody>
@@ -5275,9 +5366,9 @@
           <a:lstStyle/>
           <a:p>
             <a:pPr rtl="0"/>
-            <a:fld id="{446D2216-24AE-4A93-BEA9-26FD9BE8D8E8}" type="datetime1">
+            <a:fld id="{4469CCC5-C5D6-4AD1-95C5-B780A2B90CDA}" type="datetime1">
               <a:rPr lang="fr-FR" noProof="0" smtClean="0"/>
-              <a:t>23/01/2020</a:t>
+              <a:t>24/01/2020</a:t>
             </a:fld>
             <a:endParaRPr lang="fr-FR" noProof="0" dirty="0"/>
           </a:p>
@@ -5305,6 +5396,10 @@
           <a:lstStyle/>
           <a:p>
             <a:pPr rtl="0"/>
+            <a:r>
+              <a:rPr lang="fr-FR" noProof="0"/>
+              <a:t>Data challenge – Bankable customers</a:t>
+            </a:r>
             <a:endParaRPr lang="fr-FR" noProof="0" dirty="0"/>
           </a:p>
         </p:txBody>
@@ -5489,9 +5584,9 @@
           <a:lstStyle/>
           <a:p>
             <a:pPr rtl="0"/>
-            <a:fld id="{46C4311B-E9D3-41DC-B3A4-2DA1CBB5303E}" type="datetime1">
+            <a:fld id="{94BABFAC-954F-4B1E-8C3D-7EC0645F6FD4}" type="datetime1">
               <a:rPr lang="fr-FR" noProof="0" smtClean="0"/>
-              <a:t>23/01/2020</a:t>
+              <a:t>24/01/2020</a:t>
             </a:fld>
             <a:endParaRPr lang="fr-FR" noProof="0" dirty="0"/>
           </a:p>
@@ -5519,6 +5614,10 @@
           <a:lstStyle/>
           <a:p>
             <a:pPr rtl="0"/>
+            <a:r>
+              <a:rPr lang="fr-FR" noProof="0"/>
+              <a:t>Data challenge – Bankable customers</a:t>
+            </a:r>
             <a:endParaRPr lang="fr-FR" noProof="0" dirty="0"/>
           </a:p>
         </p:txBody>
@@ -5693,9 +5792,9 @@
           <a:lstStyle/>
           <a:p>
             <a:pPr rtl="0"/>
-            <a:fld id="{5F9393B2-D2D1-46F0-81A9-FE2ED5E7F998}" type="datetime1">
+            <a:fld id="{9EF21985-DA31-499A-A548-CB97085AC2F1}" type="datetime1">
               <a:rPr lang="fr-FR" noProof="0" smtClean="0"/>
-              <a:t>23/01/2020</a:t>
+              <a:t>24/01/2020</a:t>
             </a:fld>
             <a:endParaRPr lang="fr-FR" noProof="0" dirty="0"/>
           </a:p>
@@ -5723,6 +5822,10 @@
           <a:lstStyle/>
           <a:p>
             <a:pPr rtl="0"/>
+            <a:r>
+              <a:rPr lang="fr-FR" noProof="0"/>
+              <a:t>Data challenge – Bankable customers</a:t>
+            </a:r>
             <a:endParaRPr lang="fr-FR" noProof="0" dirty="0"/>
           </a:p>
         </p:txBody>
@@ -5973,9 +6076,9 @@
           <a:lstStyle/>
           <a:p>
             <a:pPr rtl="0"/>
-            <a:fld id="{D1E90C3F-53CA-4279-A2D5-C68C34A1B7FE}" type="datetime1">
+            <a:fld id="{385478A6-EB4D-41A0-9276-C777DCB4C088}" type="datetime1">
               <a:rPr lang="fr-FR" noProof="0" smtClean="0"/>
-              <a:t>23/01/2020</a:t>
+              <a:t>24/01/2020</a:t>
             </a:fld>
             <a:endParaRPr lang="fr-FR" noProof="0" dirty="0"/>
           </a:p>
@@ -6003,6 +6106,10 @@
           <a:lstStyle/>
           <a:p>
             <a:pPr rtl="0"/>
+            <a:r>
+              <a:rPr lang="fr-FR" noProof="0"/>
+              <a:t>Data challenge – Bankable customers</a:t>
+            </a:r>
             <a:endParaRPr lang="fr-FR" noProof="0" dirty="0"/>
           </a:p>
         </p:txBody>
@@ -6245,9 +6352,9 @@
           <a:lstStyle/>
           <a:p>
             <a:pPr rtl="0"/>
-            <a:fld id="{1BE3742E-AFBE-42DF-91BB-D2D1057FFA79}" type="datetime1">
+            <a:fld id="{BC3DD38C-4E4A-4E65-9FC9-B42D9DC08225}" type="datetime1">
               <a:rPr lang="fr-FR" noProof="0" smtClean="0"/>
-              <a:t>23/01/2020</a:t>
+              <a:t>24/01/2020</a:t>
             </a:fld>
             <a:endParaRPr lang="fr-FR" noProof="0" dirty="0"/>
           </a:p>
@@ -6275,6 +6382,10 @@
           <a:lstStyle/>
           <a:p>
             <a:pPr rtl="0"/>
+            <a:r>
+              <a:rPr lang="fr-FR" noProof="0"/>
+              <a:t>Data challenge – Bankable customers</a:t>
+            </a:r>
             <a:endParaRPr lang="fr-FR" noProof="0" dirty="0"/>
           </a:p>
         </p:txBody>
@@ -6664,9 +6775,9 @@
           <a:lstStyle/>
           <a:p>
             <a:pPr rtl="0"/>
-            <a:fld id="{CAD3CAEB-0D2D-466C-AFB9-F2937F51F366}" type="datetime1">
+            <a:fld id="{9D6E7ECE-125E-40E7-822F-F9E04C4E206D}" type="datetime1">
               <a:rPr lang="fr-FR" noProof="0" smtClean="0"/>
-              <a:t>23/01/2020</a:t>
+              <a:t>24/01/2020</a:t>
             </a:fld>
             <a:endParaRPr lang="fr-FR" noProof="0" dirty="0"/>
           </a:p>
@@ -6694,6 +6805,10 @@
           <a:lstStyle/>
           <a:p>
             <a:pPr rtl="0"/>
+            <a:r>
+              <a:rPr lang="fr-FR" noProof="0"/>
+              <a:t>Data challenge – Bankable customers</a:t>
+            </a:r>
             <a:endParaRPr lang="fr-FR" noProof="0" dirty="0"/>
           </a:p>
         </p:txBody>
@@ -6810,9 +6925,9 @@
           <a:lstStyle/>
           <a:p>
             <a:pPr rtl="0"/>
-            <a:fld id="{2E92E680-0F8A-43BD-BDFD-C0D03E7F344B}" type="datetime1">
+            <a:fld id="{BCD4055A-200F-4AAF-92B3-05288C4418E1}" type="datetime1">
               <a:rPr lang="fr-FR" noProof="0" smtClean="0"/>
-              <a:t>23/01/2020</a:t>
+              <a:t>24/01/2020</a:t>
             </a:fld>
             <a:endParaRPr lang="fr-FR" noProof="0" dirty="0"/>
           </a:p>
@@ -6840,6 +6955,10 @@
           <a:lstStyle/>
           <a:p>
             <a:pPr rtl="0"/>
+            <a:r>
+              <a:rPr lang="fr-FR" noProof="0"/>
+              <a:t>Data challenge – Bankable customers</a:t>
+            </a:r>
             <a:endParaRPr lang="fr-FR" noProof="0" dirty="0"/>
           </a:p>
         </p:txBody>
@@ -6926,9 +7045,9 @@
           <a:lstStyle/>
           <a:p>
             <a:pPr rtl="0"/>
-            <a:fld id="{FD7189FD-F089-49F7-A99B-945C4E0C4AF5}" type="datetime1">
+            <a:fld id="{DBEDF284-420E-436D-8074-2DF244444316}" type="datetime1">
               <a:rPr lang="fr-FR" noProof="0" smtClean="0"/>
-              <a:t>23/01/2020</a:t>
+              <a:t>24/01/2020</a:t>
             </a:fld>
             <a:endParaRPr lang="fr-FR" noProof="0" dirty="0"/>
           </a:p>
@@ -6956,6 +7075,10 @@
           <a:lstStyle/>
           <a:p>
             <a:pPr rtl="0"/>
+            <a:r>
+              <a:rPr lang="fr-FR" noProof="0"/>
+              <a:t>Data challenge – Bankable customers</a:t>
+            </a:r>
             <a:endParaRPr lang="fr-FR" noProof="0" dirty="0"/>
           </a:p>
         </p:txBody>
@@ -7243,9 +7366,9 @@
           <a:lstStyle/>
           <a:p>
             <a:pPr rtl="0"/>
-            <a:fld id="{9307288E-1786-4A50-AD68-D3D5A2E1F461}" type="datetime1">
+            <a:fld id="{FA1C268B-2A82-482B-89E4-1E28EA3F6A3A}" type="datetime1">
               <a:rPr lang="fr-FR" noProof="0" smtClean="0"/>
-              <a:t>23/01/2020</a:t>
+              <a:t>24/01/2020</a:t>
             </a:fld>
             <a:endParaRPr lang="fr-FR" noProof="0" dirty="0"/>
           </a:p>
@@ -7273,6 +7396,10 @@
           <a:lstStyle/>
           <a:p>
             <a:pPr rtl="0"/>
+            <a:r>
+              <a:rPr lang="fr-FR" noProof="0"/>
+              <a:t>Data challenge – Bankable customers</a:t>
+            </a:r>
             <a:endParaRPr lang="fr-FR" noProof="0" dirty="0"/>
           </a:p>
         </p:txBody>
@@ -7541,9 +7668,9 @@
           <a:lstStyle/>
           <a:p>
             <a:pPr rtl="0"/>
-            <a:fld id="{EC8A2F46-A3F2-4FAD-B8A1-978F19EF1438}" type="datetime1">
+            <a:fld id="{277F21D3-F4A8-4EEE-916A-32F7A0E64F29}" type="datetime1">
               <a:rPr lang="fr-FR" noProof="0" smtClean="0"/>
-              <a:t>23/01/2020</a:t>
+              <a:t>24/01/2020</a:t>
             </a:fld>
             <a:endParaRPr lang="fr-FR" noProof="0" dirty="0"/>
           </a:p>
@@ -7571,6 +7698,10 @@
           <a:lstStyle/>
           <a:p>
             <a:pPr rtl="0"/>
+            <a:r>
+              <a:rPr lang="fr-FR" noProof="0"/>
+              <a:t>Data challenge – Bankable customers</a:t>
+            </a:r>
             <a:endParaRPr lang="fr-FR" noProof="0" dirty="0"/>
           </a:p>
         </p:txBody>
@@ -7786,9 +7917,9 @@
           </a:lstStyle>
           <a:p>
             <a:pPr rtl="0"/>
-            <a:fld id="{78CE1DC9-D956-40C2-BAC4-4037E3AB19CC}" type="datetime1">
+            <a:fld id="{3DA51AB2-96BE-4FED-81BA-68568A918D4E}" type="datetime1">
               <a:rPr lang="fr-FR" noProof="0" smtClean="0"/>
-              <a:t>23/01/2020</a:t>
+              <a:t>24/01/2020</a:t>
             </a:fld>
             <a:endParaRPr lang="fr-FR" noProof="0" dirty="0"/>
           </a:p>
@@ -7834,6 +7965,10 @@
           </a:lstStyle>
           <a:p>
             <a:pPr rtl="0"/>
+            <a:r>
+              <a:rPr lang="fr-FR" noProof="0"/>
+              <a:t>Data challenge – Bankable customers</a:t>
+            </a:r>
             <a:endParaRPr lang="fr-FR" noProof="0" dirty="0"/>
           </a:p>
         </p:txBody>
@@ -7907,7 +8042,7 @@
     <p:sldLayoutId id="2147483658" r:id="rId10"/>
     <p:sldLayoutId id="2147483659" r:id="rId11"/>
   </p:sldLayoutIdLst>
-  <p:hf sldNum="0" hdr="0" ftr="0" dt="0"/>
+  <p:hf hdr="0" dt="0"/>
   <p:txStyles>
     <p:titleStyle>
       <a:lvl1pPr algn="l" defTabSz="914400" rtl="0" eaLnBrk="1" latinLnBrk="0" hangingPunct="1">
@@ -9651,6 +9786,132 @@
           </p:txBody>
         </p:sp>
       </p:grpSp>
+      <p:sp>
+        <p:nvSpPr>
+          <p:cNvPr id="3" name="ZoneTexte 2">
+            <a:extLst>
+              <a:ext uri="{FF2B5EF4-FFF2-40B4-BE49-F238E27FC236}">
+                <a16:creationId xmlns:a16="http://schemas.microsoft.com/office/drawing/2014/main" id="{516D97B8-611C-404E-8670-38784D6B090C}"/>
+              </a:ext>
+            </a:extLst>
+          </p:cNvPr>
+          <p:cNvSpPr txBox="1"/>
+          <p:nvPr/>
+        </p:nvSpPr>
+        <p:spPr>
+          <a:xfrm>
+            <a:off x="519221" y="495385"/>
+            <a:ext cx="2693045" cy="400110"/>
+          </a:xfrm>
+          <a:prstGeom prst="rect">
+            <a:avLst/>
+          </a:prstGeom>
+          <a:noFill/>
+        </p:spPr>
+        <p:txBody>
+          <a:bodyPr wrap="none" rtlCol="0">
+            <a:spAutoFit/>
+          </a:bodyPr>
+          <a:lstStyle/>
+          <a:p>
+            <a:r>
+              <a:rPr lang="fr-FR" sz="2000" b="1" dirty="0">
+                <a:solidFill>
+                  <a:schemeClr val="bg1"/>
+                </a:solidFill>
+              </a:rPr>
+              <a:t>Clément DECOOPMAN</a:t>
+            </a:r>
+          </a:p>
+        </p:txBody>
+      </p:sp>
+      <p:pic>
+        <p:nvPicPr>
+          <p:cNvPr id="1026" name="Picture 2" descr="Résultat de recherche d'images pour &quot;logo polytech annecy chambéry transparent&quot;">
+            <a:extLst>
+              <a:ext uri="{FF2B5EF4-FFF2-40B4-BE49-F238E27FC236}">
+                <a16:creationId xmlns:a16="http://schemas.microsoft.com/office/drawing/2014/main" id="{C6254AE1-C700-4A80-A95D-F2B72761FB40}"/>
+              </a:ext>
+            </a:extLst>
+          </p:cNvPr>
+          <p:cNvPicPr>
+            <a:picLocks noChangeAspect="1" noChangeArrowheads="1"/>
+          </p:cNvPicPr>
+          <p:nvPr/>
+        </p:nvPicPr>
+        <p:blipFill>
+          <a:blip r:embed="rId3">
+            <a:extLst>
+              <a:ext uri="{28A0092B-C50C-407E-A947-70E740481C1C}">
+                <a14:useLocalDpi xmlns:a14="http://schemas.microsoft.com/office/drawing/2010/main" val="0"/>
+              </a:ext>
+            </a:extLst>
+          </a:blip>
+          <a:srcRect/>
+          <a:stretch>
+            <a:fillRect/>
+          </a:stretch>
+        </p:blipFill>
+        <p:spPr bwMode="auto">
+          <a:xfrm>
+            <a:off x="8103220" y="302092"/>
+            <a:ext cx="3569560" cy="1056925"/>
+          </a:xfrm>
+          <a:prstGeom prst="rect">
+            <a:avLst/>
+          </a:prstGeom>
+          <a:noFill/>
+          <a:extLst>
+            <a:ext uri="{909E8E84-426E-40DD-AFC4-6F175D3DCCD1}">
+              <a14:hiddenFill xmlns:a14="http://schemas.microsoft.com/office/drawing/2010/main">
+                <a:solidFill>
+                  <a:srgbClr val="FFFFFF"/>
+                </a:solidFill>
+              </a14:hiddenFill>
+            </a:ext>
+          </a:extLst>
+        </p:spPr>
+      </p:pic>
+      <p:sp>
+        <p:nvSpPr>
+          <p:cNvPr id="6" name="ZoneTexte 5">
+            <a:extLst>
+              <a:ext uri="{FF2B5EF4-FFF2-40B4-BE49-F238E27FC236}">
+                <a16:creationId xmlns:a16="http://schemas.microsoft.com/office/drawing/2014/main" id="{A4527264-9AD8-4B10-826D-0FAA8B6506A4}"/>
+              </a:ext>
+            </a:extLst>
+          </p:cNvPr>
+          <p:cNvSpPr txBox="1"/>
+          <p:nvPr/>
+        </p:nvSpPr>
+        <p:spPr>
+          <a:xfrm>
+            <a:off x="519220" y="928049"/>
+            <a:ext cx="1745991" cy="523220"/>
+          </a:xfrm>
+          <a:prstGeom prst="rect">
+            <a:avLst/>
+          </a:prstGeom>
+          <a:noFill/>
+        </p:spPr>
+        <p:txBody>
+          <a:bodyPr wrap="none" rtlCol="0">
+            <a:spAutoFit/>
+          </a:bodyPr>
+          <a:lstStyle/>
+          <a:p>
+            <a:r>
+              <a:rPr lang="fr-FR" sz="2800" dirty="0">
+                <a:solidFill>
+                  <a:schemeClr val="accent4"/>
+                </a:solidFill>
+              </a:rPr>
+              <a:t>2019-2020</a:t>
+            </a:r>
+            <a:endParaRPr lang="fr-FR" sz="2800" dirty="0"/>
+          </a:p>
+        </p:txBody>
+      </p:sp>
     </p:spTree>
     <p:extLst>
       <p:ext uri="{BB962C8B-B14F-4D97-AF65-F5344CB8AC3E}">
@@ -10385,6 +10646,66 @@
           </a:p>
         </p:txBody>
       </p:sp>
+      <p:sp>
+        <p:nvSpPr>
+          <p:cNvPr id="2" name="Espace réservé du pied de page 1">
+            <a:extLst>
+              <a:ext uri="{FF2B5EF4-FFF2-40B4-BE49-F238E27FC236}">
+                <a16:creationId xmlns:a16="http://schemas.microsoft.com/office/drawing/2014/main" id="{9E4F754F-AE80-4D47-8202-B5E7ADB3FA56}"/>
+              </a:ext>
+            </a:extLst>
+          </p:cNvPr>
+          <p:cNvSpPr>
+            <a:spLocks noGrp="1"/>
+          </p:cNvSpPr>
+          <p:nvPr>
+            <p:ph type="ftr" sz="quarter" idx="11"/>
+          </p:nvPr>
+        </p:nvSpPr>
+        <p:spPr/>
+        <p:txBody>
+          <a:bodyPr/>
+          <a:lstStyle/>
+          <a:p>
+            <a:pPr rtl="0"/>
+            <a:r>
+              <a:rPr lang="fr-FR" noProof="0"/>
+              <a:t>Data challenge – Bankable customers</a:t>
+            </a:r>
+            <a:endParaRPr lang="fr-FR" noProof="0" dirty="0"/>
+          </a:p>
+        </p:txBody>
+      </p:sp>
+      <p:sp>
+        <p:nvSpPr>
+          <p:cNvPr id="3" name="Espace réservé du numéro de diapositive 2">
+            <a:extLst>
+              <a:ext uri="{FF2B5EF4-FFF2-40B4-BE49-F238E27FC236}">
+                <a16:creationId xmlns:a16="http://schemas.microsoft.com/office/drawing/2014/main" id="{043FB8A4-98B2-4119-A4BC-986C9AC1AFAB}"/>
+              </a:ext>
+            </a:extLst>
+          </p:cNvPr>
+          <p:cNvSpPr>
+            <a:spLocks noGrp="1"/>
+          </p:cNvSpPr>
+          <p:nvPr>
+            <p:ph type="sldNum" sz="quarter" idx="12"/>
+          </p:nvPr>
+        </p:nvSpPr>
+        <p:spPr/>
+        <p:txBody>
+          <a:bodyPr/>
+          <a:lstStyle/>
+          <a:p>
+            <a:pPr rtl="0"/>
+            <a:fld id="{06FEDF93-2BFD-41CA-ABC7-B039102F3792}" type="slidenum">
+              <a:rPr lang="fr-FR" noProof="0" smtClean="0"/>
+              <a:t>11</a:t>
+            </a:fld>
+            <a:endParaRPr lang="fr-FR" noProof="0" dirty="0"/>
+          </a:p>
+        </p:txBody>
+      </p:sp>
     </p:spTree>
     <p:extLst>
       <p:ext uri="{BB962C8B-B14F-4D97-AF65-F5344CB8AC3E}">
@@ -10400,6 +10721,468 @@
 
 <file path=ppt/slides/slide12.xml><?xml version="1.0" encoding="utf-8"?>
 <p:sld xmlns:a="http://schemas.openxmlformats.org/drawingml/2006/main" xmlns:r="http://schemas.openxmlformats.org/officeDocument/2006/relationships" xmlns:p="http://schemas.openxmlformats.org/presentationml/2006/main">
+  <p:cSld>
+    <p:spTree>
+      <p:nvGrpSpPr>
+        <p:cNvPr id="1" name=""/>
+        <p:cNvGrpSpPr/>
+        <p:nvPr/>
+      </p:nvGrpSpPr>
+      <p:grpSpPr>
+        <a:xfrm>
+          <a:off x="0" y="0"/>
+          <a:ext cx="0" cy="0"/>
+          <a:chOff x="0" y="0"/>
+          <a:chExt cx="0" cy="0"/>
+        </a:xfrm>
+      </p:grpSpPr>
+      <p:sp>
+        <p:nvSpPr>
+          <p:cNvPr id="4" name="Titre 3" hidden="1">
+            <a:extLst>
+              <a:ext uri="{FF2B5EF4-FFF2-40B4-BE49-F238E27FC236}">
+                <a16:creationId xmlns:a16="http://schemas.microsoft.com/office/drawing/2014/main" id="{B5981CF1-BC08-49F8-B0F9-AAF98EC67450}"/>
+              </a:ext>
+            </a:extLst>
+          </p:cNvPr>
+          <p:cNvSpPr>
+            <a:spLocks noGrp="1"/>
+          </p:cNvSpPr>
+          <p:nvPr>
+            <p:ph type="title" idx="4294967295"/>
+          </p:nvPr>
+        </p:nvSpPr>
+        <p:spPr>
+          <a:xfrm>
+            <a:off x="0" y="365125"/>
+            <a:ext cx="10515600" cy="1325563"/>
+          </a:xfrm>
+        </p:spPr>
+        <p:txBody>
+          <a:bodyPr rtlCol="0"/>
+          <a:lstStyle/>
+          <a:p>
+            <a:r>
+              <a:rPr lang="fr-FR" dirty="0"/>
+              <a:t>Analyse du projet : diapositive </a:t>
+            </a:r>
+            <a:r>
+              <a:rPr lang="fr" dirty="0"/>
+              <a:t>2</a:t>
+            </a:r>
+          </a:p>
+        </p:txBody>
+      </p:sp>
+      <p:cxnSp>
+        <p:nvCxnSpPr>
+          <p:cNvPr id="8" name="Connecteur droit 7">
+            <a:extLst>
+              <a:ext uri="{FF2B5EF4-FFF2-40B4-BE49-F238E27FC236}">
+                <a16:creationId xmlns:a16="http://schemas.microsoft.com/office/drawing/2014/main" id="{D0986099-F5F2-4E8B-BE17-81194861A00C}"/>
+              </a:ext>
+              <a:ext uri="{C183D7F6-B498-43B3-948B-1728B52AA6E4}">
+                <adec:decorative xmlns:adec="http://schemas.microsoft.com/office/drawing/2017/decorative" val="1"/>
+              </a:ext>
+            </a:extLst>
+          </p:cNvPr>
+          <p:cNvCxnSpPr>
+            <a:cxnSpLocks/>
+          </p:cNvCxnSpPr>
+          <p:nvPr/>
+        </p:nvCxnSpPr>
+        <p:spPr>
+          <a:xfrm>
+            <a:off x="8225640" y="606788"/>
+            <a:ext cx="3966360" cy="0"/>
+          </a:xfrm>
+          <a:prstGeom prst="line">
+            <a:avLst/>
+          </a:prstGeom>
+          <a:ln>
+            <a:solidFill>
+              <a:schemeClr val="accent3">
+                <a:lumMod val="50000"/>
+              </a:schemeClr>
+            </a:solidFill>
+            <a:headEnd type="oval"/>
+          </a:ln>
+        </p:spPr>
+        <p:style>
+          <a:lnRef idx="1">
+            <a:schemeClr val="accent1"/>
+          </a:lnRef>
+          <a:fillRef idx="0">
+            <a:schemeClr val="accent1"/>
+          </a:fillRef>
+          <a:effectRef idx="0">
+            <a:schemeClr val="accent1"/>
+          </a:effectRef>
+          <a:fontRef idx="minor">
+            <a:schemeClr val="tx1"/>
+          </a:fontRef>
+        </p:style>
+      </p:cxnSp>
+      <p:sp>
+        <p:nvSpPr>
+          <p:cNvPr id="11" name="Titre 1">
+            <a:extLst>
+              <a:ext uri="{FF2B5EF4-FFF2-40B4-BE49-F238E27FC236}">
+                <a16:creationId xmlns:a16="http://schemas.microsoft.com/office/drawing/2014/main" id="{4E3F5479-058B-4FA8-92E9-18CAB8CDC5C5}"/>
+              </a:ext>
+            </a:extLst>
+          </p:cNvPr>
+          <p:cNvSpPr txBox="1">
+            <a:spLocks/>
+          </p:cNvSpPr>
+          <p:nvPr/>
+        </p:nvSpPr>
+        <p:spPr>
+          <a:xfrm>
+            <a:off x="3417583" y="296964"/>
+            <a:ext cx="5257800" cy="775597"/>
+          </a:xfrm>
+          <a:prstGeom prst="rect">
+            <a:avLst/>
+          </a:prstGeom>
+        </p:spPr>
+        <p:txBody>
+          <a:bodyPr vert="horz" wrap="square" lIns="0" tIns="0" rIns="0" bIns="0" rtlCol="0" anchor="t">
+            <a:spAutoFit/>
+          </a:bodyPr>
+          <a:lstStyle>
+            <a:lvl1pPr algn="l" defTabSz="914400" rtl="0" eaLnBrk="1" latinLnBrk="0" hangingPunct="1">
+              <a:lnSpc>
+                <a:spcPct val="90000"/>
+              </a:lnSpc>
+              <a:spcBef>
+                <a:spcPct val="0"/>
+              </a:spcBef>
+              <a:buNone/>
+              <a:defRPr sz="4400" kern="1200">
+                <a:solidFill>
+                  <a:schemeClr val="tx1"/>
+                </a:solidFill>
+                <a:latin typeface="+mj-lt"/>
+                <a:ea typeface="+mj-ea"/>
+                <a:cs typeface="+mj-cs"/>
+              </a:defRPr>
+            </a:lvl1pPr>
+          </a:lstStyle>
+          <a:p>
+            <a:pPr algn="ctr" rtl="0"/>
+            <a:r>
+              <a:rPr lang="fr-FR" sz="2800" b="1" dirty="0">
+                <a:solidFill>
+                  <a:schemeClr val="tx1">
+                    <a:lumMod val="75000"/>
+                    <a:lumOff val="25000"/>
+                  </a:schemeClr>
+                </a:solidFill>
+              </a:rPr>
+              <a:t>Schéma final</a:t>
+            </a:r>
+            <a:br>
+              <a:rPr lang="fr-FR" sz="2800" dirty="0">
+                <a:solidFill>
+                  <a:schemeClr val="tx1">
+                    <a:lumMod val="75000"/>
+                    <a:lumOff val="25000"/>
+                  </a:schemeClr>
+                </a:solidFill>
+              </a:rPr>
+            </a:br>
+            <a:endParaRPr lang="fr-FR" sz="2800" dirty="0">
+              <a:solidFill>
+                <a:schemeClr val="tx1">
+                  <a:lumMod val="75000"/>
+                  <a:lumOff val="25000"/>
+                </a:schemeClr>
+              </a:solidFill>
+            </a:endParaRPr>
+          </a:p>
+        </p:txBody>
+      </p:sp>
+      <p:cxnSp>
+        <p:nvCxnSpPr>
+          <p:cNvPr id="14" name="Connecteur droit 13">
+            <a:extLst>
+              <a:ext uri="{FF2B5EF4-FFF2-40B4-BE49-F238E27FC236}">
+                <a16:creationId xmlns:a16="http://schemas.microsoft.com/office/drawing/2014/main" id="{83E690F4-843A-47A5-8620-4FB01C0D8E68}"/>
+              </a:ext>
+              <a:ext uri="{C183D7F6-B498-43B3-948B-1728B52AA6E4}">
+                <adec:decorative xmlns:adec="http://schemas.microsoft.com/office/drawing/2017/decorative" val="1"/>
+              </a:ext>
+            </a:extLst>
+          </p:cNvPr>
+          <p:cNvCxnSpPr>
+            <a:cxnSpLocks/>
+          </p:cNvCxnSpPr>
+          <p:nvPr/>
+        </p:nvCxnSpPr>
+        <p:spPr>
+          <a:xfrm>
+            <a:off x="0" y="606788"/>
+            <a:ext cx="3867325" cy="0"/>
+          </a:xfrm>
+          <a:prstGeom prst="line">
+            <a:avLst/>
+          </a:prstGeom>
+          <a:ln>
+            <a:solidFill>
+              <a:schemeClr val="accent3">
+                <a:lumMod val="50000"/>
+              </a:schemeClr>
+            </a:solidFill>
+            <a:tailEnd type="oval"/>
+          </a:ln>
+        </p:spPr>
+        <p:style>
+          <a:lnRef idx="1">
+            <a:schemeClr val="accent1"/>
+          </a:lnRef>
+          <a:fillRef idx="0">
+            <a:schemeClr val="accent1"/>
+          </a:fillRef>
+          <a:effectRef idx="0">
+            <a:schemeClr val="accent1"/>
+          </a:effectRef>
+          <a:fontRef idx="minor">
+            <a:schemeClr val="tx1"/>
+          </a:fontRef>
+        </p:style>
+      </p:cxnSp>
+      <p:sp>
+        <p:nvSpPr>
+          <p:cNvPr id="43" name="Titre 1">
+            <a:extLst>
+              <a:ext uri="{FF2B5EF4-FFF2-40B4-BE49-F238E27FC236}">
+                <a16:creationId xmlns:a16="http://schemas.microsoft.com/office/drawing/2014/main" id="{8D1BCB10-65E7-436A-85B9-96D677E618F2}"/>
+              </a:ext>
+            </a:extLst>
+          </p:cNvPr>
+          <p:cNvSpPr txBox="1">
+            <a:spLocks/>
+          </p:cNvSpPr>
+          <p:nvPr/>
+        </p:nvSpPr>
+        <p:spPr>
+          <a:xfrm>
+            <a:off x="8900719" y="230277"/>
+            <a:ext cx="3192247" cy="221599"/>
+          </a:xfrm>
+          <a:prstGeom prst="rect">
+            <a:avLst/>
+          </a:prstGeom>
+        </p:spPr>
+        <p:txBody>
+          <a:bodyPr vert="horz" wrap="square" lIns="0" tIns="0" rIns="0" bIns="0" rtlCol="0" anchor="t">
+            <a:spAutoFit/>
+          </a:bodyPr>
+          <a:lstStyle>
+            <a:lvl1pPr algn="l" defTabSz="914400" rtl="0" eaLnBrk="1" latinLnBrk="0" hangingPunct="1">
+              <a:lnSpc>
+                <a:spcPct val="90000"/>
+              </a:lnSpc>
+              <a:spcBef>
+                <a:spcPct val="0"/>
+              </a:spcBef>
+              <a:buNone/>
+              <a:defRPr sz="4400" kern="1200">
+                <a:solidFill>
+                  <a:schemeClr val="tx1"/>
+                </a:solidFill>
+                <a:latin typeface="+mj-lt"/>
+                <a:ea typeface="+mj-ea"/>
+                <a:cs typeface="+mj-cs"/>
+              </a:defRPr>
+            </a:lvl1pPr>
+          </a:lstStyle>
+          <a:p>
+            <a:pPr algn="ctr" rtl="0"/>
+            <a:r>
+              <a:rPr lang="fr-FR" sz="1600" b="1" dirty="0">
+                <a:solidFill>
+                  <a:schemeClr val="tx1">
+                    <a:lumMod val="75000"/>
+                    <a:lumOff val="25000"/>
+                  </a:schemeClr>
+                </a:solidFill>
+              </a:rPr>
+              <a:t>Choix de conception 3/3</a:t>
+            </a:r>
+            <a:endParaRPr lang="fr-FR" sz="1600" dirty="0">
+              <a:solidFill>
+                <a:schemeClr val="tx1">
+                  <a:lumMod val="75000"/>
+                  <a:lumOff val="25000"/>
+                </a:schemeClr>
+              </a:solidFill>
+            </a:endParaRPr>
+          </a:p>
+        </p:txBody>
+      </p:sp>
+      <p:sp>
+        <p:nvSpPr>
+          <p:cNvPr id="9" name="ZoneTexte 8">
+            <a:extLst>
+              <a:ext uri="{FF2B5EF4-FFF2-40B4-BE49-F238E27FC236}">
+                <a16:creationId xmlns:a16="http://schemas.microsoft.com/office/drawing/2014/main" id="{02DD0193-80E3-48D7-B6FA-A6337F94FFFD}"/>
+              </a:ext>
+            </a:extLst>
+          </p:cNvPr>
+          <p:cNvSpPr txBox="1"/>
+          <p:nvPr/>
+        </p:nvSpPr>
+        <p:spPr>
+          <a:xfrm>
+            <a:off x="6837582" y="5691418"/>
+            <a:ext cx="4446165" cy="369332"/>
+          </a:xfrm>
+          <a:prstGeom prst="rect">
+            <a:avLst/>
+          </a:prstGeom>
+          <a:noFill/>
+        </p:spPr>
+        <p:txBody>
+          <a:bodyPr wrap="square" rtlCol="0">
+            <a:spAutoFit/>
+          </a:bodyPr>
+          <a:lstStyle/>
+          <a:p>
+            <a:r>
+              <a:rPr lang="fr-FR" dirty="0">
+                <a:solidFill>
+                  <a:schemeClr val="tx1">
+                    <a:lumMod val="75000"/>
+                    <a:lumOff val="25000"/>
+                  </a:schemeClr>
+                </a:solidFill>
+                <a:latin typeface="Calibri" panose="020F0502020204030204" pitchFamily="34" charset="0"/>
+                <a:cs typeface="Calibri" panose="020F0502020204030204" pitchFamily="34" charset="0"/>
+              </a:rPr>
+              <a:t>Précision maximale obtenue : 87,5%</a:t>
+            </a:r>
+            <a:endParaRPr lang="fr-FR" dirty="0">
+              <a:latin typeface="Calibri" panose="020F0502020204030204" pitchFamily="34" charset="0"/>
+              <a:cs typeface="Calibri" panose="020F0502020204030204" pitchFamily="34" charset="0"/>
+            </a:endParaRPr>
+          </a:p>
+        </p:txBody>
+      </p:sp>
+      <p:pic>
+        <p:nvPicPr>
+          <p:cNvPr id="3" name="Graphique 2">
+            <a:extLst>
+              <a:ext uri="{FF2B5EF4-FFF2-40B4-BE49-F238E27FC236}">
+                <a16:creationId xmlns:a16="http://schemas.microsoft.com/office/drawing/2014/main" id="{BAC60BE8-3B0B-440F-8035-0F51C126A018}"/>
+              </a:ext>
+            </a:extLst>
+          </p:cNvPr>
+          <p:cNvPicPr>
+            <a:picLocks noChangeAspect="1"/>
+          </p:cNvPicPr>
+          <p:nvPr/>
+        </p:nvPicPr>
+        <p:blipFill>
+          <a:blip r:embed="rId3">
+            <a:extLst>
+              <a:ext uri="{28A0092B-C50C-407E-A947-70E740481C1C}">
+                <a14:useLocalDpi xmlns:a14="http://schemas.microsoft.com/office/drawing/2010/main" val="0"/>
+              </a:ext>
+              <a:ext uri="{96DAC541-7B7A-43D3-8B79-37D633B846F1}">
+                <asvg:svgBlip xmlns:asvg="http://schemas.microsoft.com/office/drawing/2016/SVG/main" r:embed="rId4"/>
+              </a:ext>
+            </a:extLst>
+          </a:blip>
+          <a:stretch>
+            <a:fillRect/>
+          </a:stretch>
+        </p:blipFill>
+        <p:spPr>
+          <a:xfrm>
+            <a:off x="766762" y="1995487"/>
+            <a:ext cx="10658475" cy="2867025"/>
+          </a:xfrm>
+          <a:prstGeom prst="rect">
+            <a:avLst/>
+          </a:prstGeom>
+        </p:spPr>
+      </p:pic>
+      <p:sp>
+        <p:nvSpPr>
+          <p:cNvPr id="5" name="Espace réservé du pied de page 4">
+            <a:extLst>
+              <a:ext uri="{FF2B5EF4-FFF2-40B4-BE49-F238E27FC236}">
+                <a16:creationId xmlns:a16="http://schemas.microsoft.com/office/drawing/2014/main" id="{1A6D8ABA-93E8-4920-B2ED-D6619D2CF646}"/>
+              </a:ext>
+            </a:extLst>
+          </p:cNvPr>
+          <p:cNvSpPr>
+            <a:spLocks noGrp="1"/>
+          </p:cNvSpPr>
+          <p:nvPr>
+            <p:ph type="ftr" sz="quarter" idx="11"/>
+          </p:nvPr>
+        </p:nvSpPr>
+        <p:spPr/>
+        <p:txBody>
+          <a:bodyPr/>
+          <a:lstStyle/>
+          <a:p>
+            <a:pPr rtl="0"/>
+            <a:r>
+              <a:rPr lang="fr-FR" noProof="0"/>
+              <a:t>Data challenge – Bankable customers</a:t>
+            </a:r>
+            <a:endParaRPr lang="fr-FR" noProof="0" dirty="0"/>
+          </a:p>
+        </p:txBody>
+      </p:sp>
+      <p:sp>
+        <p:nvSpPr>
+          <p:cNvPr id="6" name="Espace réservé du numéro de diapositive 5">
+            <a:extLst>
+              <a:ext uri="{FF2B5EF4-FFF2-40B4-BE49-F238E27FC236}">
+                <a16:creationId xmlns:a16="http://schemas.microsoft.com/office/drawing/2014/main" id="{01016019-4BB7-45C1-96FE-0EA2DA11E8C4}"/>
+              </a:ext>
+            </a:extLst>
+          </p:cNvPr>
+          <p:cNvSpPr>
+            <a:spLocks noGrp="1"/>
+          </p:cNvSpPr>
+          <p:nvPr>
+            <p:ph type="sldNum" sz="quarter" idx="12"/>
+          </p:nvPr>
+        </p:nvSpPr>
+        <p:spPr/>
+        <p:txBody>
+          <a:bodyPr/>
+          <a:lstStyle/>
+          <a:p>
+            <a:pPr rtl="0"/>
+            <a:fld id="{06FEDF93-2BFD-41CA-ABC7-B039102F3792}" type="slidenum">
+              <a:rPr lang="fr-FR" noProof="0" smtClean="0"/>
+              <a:t>12</a:t>
+            </a:fld>
+            <a:endParaRPr lang="fr-FR" noProof="0" dirty="0"/>
+          </a:p>
+        </p:txBody>
+      </p:sp>
+    </p:spTree>
+    <p:extLst>
+      <p:ext uri="{BB962C8B-B14F-4D97-AF65-F5344CB8AC3E}">
+        <p14:creationId xmlns:p14="http://schemas.microsoft.com/office/powerpoint/2010/main" val="986627312"/>
+      </p:ext>
+    </p:extLst>
+  </p:cSld>
+  <p:clrMapOvr>
+    <a:masterClrMapping/>
+  </p:clrMapOvr>
+</p:sld>
+</file>
+
+<file path=ppt/slides/slide13.xml><?xml version="1.0" encoding="utf-8"?>
+<p:sld xmlns:a="http://schemas.openxmlformats.org/drawingml/2006/main" xmlns:r="http://schemas.openxmlformats.org/officeDocument/2006/relationships" xmlns:p="http://schemas.openxmlformats.org/presentationml/2006/main" show="0">
   <p:cSld>
     <p:spTree>
       <p:nvGrpSpPr>
@@ -11061,6 +11844,66 @@
           </a:p>
         </p:txBody>
       </p:sp>
+      <p:sp>
+        <p:nvSpPr>
+          <p:cNvPr id="2" name="Espace réservé du pied de page 1">
+            <a:extLst>
+              <a:ext uri="{FF2B5EF4-FFF2-40B4-BE49-F238E27FC236}">
+                <a16:creationId xmlns:a16="http://schemas.microsoft.com/office/drawing/2014/main" id="{C1AC6ADE-ABC9-4C35-86DE-75F6078CA34A}"/>
+              </a:ext>
+            </a:extLst>
+          </p:cNvPr>
+          <p:cNvSpPr>
+            <a:spLocks noGrp="1"/>
+          </p:cNvSpPr>
+          <p:nvPr>
+            <p:ph type="ftr" sz="quarter" idx="11"/>
+          </p:nvPr>
+        </p:nvSpPr>
+        <p:spPr/>
+        <p:txBody>
+          <a:bodyPr/>
+          <a:lstStyle/>
+          <a:p>
+            <a:pPr rtl="0"/>
+            <a:r>
+              <a:rPr lang="fr-FR" noProof="0"/>
+              <a:t>Data challenge – Bankable customers</a:t>
+            </a:r>
+            <a:endParaRPr lang="fr-FR" noProof="0" dirty="0"/>
+          </a:p>
+        </p:txBody>
+      </p:sp>
+      <p:sp>
+        <p:nvSpPr>
+          <p:cNvPr id="3" name="Espace réservé du numéro de diapositive 2">
+            <a:extLst>
+              <a:ext uri="{FF2B5EF4-FFF2-40B4-BE49-F238E27FC236}">
+                <a16:creationId xmlns:a16="http://schemas.microsoft.com/office/drawing/2014/main" id="{C59A5E33-7714-427B-A86A-FBC7E63E3354}"/>
+              </a:ext>
+            </a:extLst>
+          </p:cNvPr>
+          <p:cNvSpPr>
+            <a:spLocks noGrp="1"/>
+          </p:cNvSpPr>
+          <p:nvPr>
+            <p:ph type="sldNum" sz="quarter" idx="12"/>
+          </p:nvPr>
+        </p:nvSpPr>
+        <p:spPr/>
+        <p:txBody>
+          <a:bodyPr/>
+          <a:lstStyle/>
+          <a:p>
+            <a:pPr rtl="0"/>
+            <a:fld id="{06FEDF93-2BFD-41CA-ABC7-B039102F3792}" type="slidenum">
+              <a:rPr lang="fr-FR" noProof="0" smtClean="0"/>
+              <a:t>13</a:t>
+            </a:fld>
+            <a:endParaRPr lang="fr-FR" noProof="0" dirty="0"/>
+          </a:p>
+        </p:txBody>
+      </p:sp>
     </p:spTree>
     <p:extLst>
       <p:ext uri="{BB962C8B-B14F-4D97-AF65-F5344CB8AC3E}">
@@ -11074,8 +11917,8 @@
 </p:sld>
 </file>
 
-<file path=ppt/slides/slide13.xml><?xml version="1.0" encoding="utf-8"?>
-<p:sld xmlns:a="http://schemas.openxmlformats.org/drawingml/2006/main" xmlns:r="http://schemas.openxmlformats.org/officeDocument/2006/relationships" xmlns:p="http://schemas.openxmlformats.org/presentationml/2006/main">
+<file path=ppt/slides/slide14.xml><?xml version="1.0" encoding="utf-8"?>
+<p:sld xmlns:a="http://schemas.openxmlformats.org/drawingml/2006/main" xmlns:r="http://schemas.openxmlformats.org/officeDocument/2006/relationships" xmlns:p="http://schemas.openxmlformats.org/presentationml/2006/main" show="0">
   <p:cSld>
     <p:spTree>
       <p:nvGrpSpPr>
@@ -11460,6 +12303,66 @@
           </a:p>
         </p:txBody>
       </p:sp>
+      <p:sp>
+        <p:nvSpPr>
+          <p:cNvPr id="2" name="Espace réservé du pied de page 1">
+            <a:extLst>
+              <a:ext uri="{FF2B5EF4-FFF2-40B4-BE49-F238E27FC236}">
+                <a16:creationId xmlns:a16="http://schemas.microsoft.com/office/drawing/2014/main" id="{2D04FA9F-417E-4D26-B7B7-26D4D8BE9010}"/>
+              </a:ext>
+            </a:extLst>
+          </p:cNvPr>
+          <p:cNvSpPr>
+            <a:spLocks noGrp="1"/>
+          </p:cNvSpPr>
+          <p:nvPr>
+            <p:ph type="ftr" sz="quarter" idx="11"/>
+          </p:nvPr>
+        </p:nvSpPr>
+        <p:spPr/>
+        <p:txBody>
+          <a:bodyPr/>
+          <a:lstStyle/>
+          <a:p>
+            <a:pPr rtl="0"/>
+            <a:r>
+              <a:rPr lang="fr-FR" noProof="0"/>
+              <a:t>Data challenge – Bankable customers</a:t>
+            </a:r>
+            <a:endParaRPr lang="fr-FR" noProof="0" dirty="0"/>
+          </a:p>
+        </p:txBody>
+      </p:sp>
+      <p:sp>
+        <p:nvSpPr>
+          <p:cNvPr id="3" name="Espace réservé du numéro de diapositive 2">
+            <a:extLst>
+              <a:ext uri="{FF2B5EF4-FFF2-40B4-BE49-F238E27FC236}">
+                <a16:creationId xmlns:a16="http://schemas.microsoft.com/office/drawing/2014/main" id="{D6A6E23B-937E-4EC0-9BD2-EA3C484FF988}"/>
+              </a:ext>
+            </a:extLst>
+          </p:cNvPr>
+          <p:cNvSpPr>
+            <a:spLocks noGrp="1"/>
+          </p:cNvSpPr>
+          <p:nvPr>
+            <p:ph type="sldNum" sz="quarter" idx="12"/>
+          </p:nvPr>
+        </p:nvSpPr>
+        <p:spPr/>
+        <p:txBody>
+          <a:bodyPr/>
+          <a:lstStyle/>
+          <a:p>
+            <a:pPr rtl="0"/>
+            <a:fld id="{06FEDF93-2BFD-41CA-ABC7-B039102F3792}" type="slidenum">
+              <a:rPr lang="fr-FR" noProof="0" smtClean="0"/>
+              <a:t>14</a:t>
+            </a:fld>
+            <a:endParaRPr lang="fr-FR" noProof="0" dirty="0"/>
+          </a:p>
+        </p:txBody>
+      </p:sp>
     </p:spTree>
     <p:extLst>
       <p:ext uri="{BB962C8B-B14F-4D97-AF65-F5344CB8AC3E}">
@@ -11473,7 +12376,7 @@
 </p:sld>
 </file>
 
-<file path=ppt/slides/slide14.xml><?xml version="1.0" encoding="utf-8"?>
+<file path=ppt/slides/slide15.xml><?xml version="1.0" encoding="utf-8"?>
 <p:sld xmlns:a="http://schemas.openxmlformats.org/drawingml/2006/main" xmlns:r="http://schemas.openxmlformats.org/officeDocument/2006/relationships" xmlns:p="http://schemas.openxmlformats.org/presentationml/2006/main">
   <p:cSld>
     <p:bg>
@@ -11680,41 +12583,6 @@
           </a:p>
         </p:txBody>
       </p:sp>
-      <p:pic>
-        <p:nvPicPr>
-          <p:cNvPr id="6" name="Image 5" descr="Cette image est une icône indiquant « 24 diapositives ».">
-            <a:hlinkClick r:id="rId3"/>
-            <a:extLst>
-              <a:ext uri="{FF2B5EF4-FFF2-40B4-BE49-F238E27FC236}">
-                <a16:creationId xmlns:a16="http://schemas.microsoft.com/office/drawing/2014/main" id="{A86744F2-5246-4A0A-B119-35E7FB76A0D8}"/>
-              </a:ext>
-              <a:ext uri="{C183D7F6-B498-43B3-948B-1728B52AA6E4}">
-                <adec:decorative xmlns:adec="http://schemas.microsoft.com/office/drawing/2017/decorative" val="0"/>
-              </a:ext>
-            </a:extLst>
-          </p:cNvPr>
-          <p:cNvPicPr>
-            <a:picLocks noChangeAspect="1"/>
-          </p:cNvPicPr>
-          <p:nvPr/>
-        </p:nvPicPr>
-        <p:blipFill>
-          <a:blip r:embed="rId4"/>
-          <a:stretch>
-            <a:fillRect/>
-          </a:stretch>
-        </p:blipFill>
-        <p:spPr>
-          <a:xfrm>
-            <a:off x="5360332" y="5919419"/>
-            <a:ext cx="1471335" cy="420363"/>
-          </a:xfrm>
-          <a:prstGeom prst="rect">
-            <a:avLst/>
-          </a:prstGeom>
-          <a:effectLst/>
-        </p:spPr>
-      </p:pic>
     </p:spTree>
     <p:extLst>
       <p:ext uri="{BB962C8B-B14F-4D97-AF65-F5344CB8AC3E}">
@@ -17832,6 +18700,70 @@
           </a:p>
         </p:txBody>
       </p:sp>
+      <p:sp>
+        <p:nvSpPr>
+          <p:cNvPr id="2" name="Espace réservé du pied de page 1">
+            <a:extLst>
+              <a:ext uri="{FF2B5EF4-FFF2-40B4-BE49-F238E27FC236}">
+                <a16:creationId xmlns:a16="http://schemas.microsoft.com/office/drawing/2014/main" id="{ED18E4AE-EFFD-4772-98FA-DFEB9438697F}"/>
+              </a:ext>
+            </a:extLst>
+          </p:cNvPr>
+          <p:cNvSpPr>
+            <a:spLocks noGrp="1"/>
+          </p:cNvSpPr>
+          <p:nvPr>
+            <p:ph type="ftr" sz="quarter" idx="11"/>
+          </p:nvPr>
+        </p:nvSpPr>
+        <p:spPr/>
+        <p:txBody>
+          <a:bodyPr/>
+          <a:lstStyle/>
+          <a:p>
+            <a:pPr rtl="0"/>
+            <a:r>
+              <a:rPr lang="fr-FR" noProof="0" dirty="0"/>
+              <a:t>Data challenge – Bankable </a:t>
+            </a:r>
+            <a:r>
+              <a:rPr lang="fr-FR" noProof="0" dirty="0" err="1"/>
+              <a:t>customers</a:t>
+            </a:r>
+            <a:endParaRPr lang="fr-FR" noProof="0" dirty="0"/>
+          </a:p>
+        </p:txBody>
+      </p:sp>
+      <p:sp>
+        <p:nvSpPr>
+          <p:cNvPr id="3" name="Espace réservé du numéro de diapositive 2">
+            <a:extLst>
+              <a:ext uri="{FF2B5EF4-FFF2-40B4-BE49-F238E27FC236}">
+                <a16:creationId xmlns:a16="http://schemas.microsoft.com/office/drawing/2014/main" id="{0675E79F-51EA-4CA5-B1AC-FF7C933A2D4B}"/>
+              </a:ext>
+            </a:extLst>
+          </p:cNvPr>
+          <p:cNvSpPr>
+            <a:spLocks noGrp="1"/>
+          </p:cNvSpPr>
+          <p:nvPr>
+            <p:ph type="sldNum" sz="quarter" idx="12"/>
+          </p:nvPr>
+        </p:nvSpPr>
+        <p:spPr/>
+        <p:txBody>
+          <a:bodyPr/>
+          <a:lstStyle/>
+          <a:p>
+            <a:pPr rtl="0"/>
+            <a:fld id="{06FEDF93-2BFD-41CA-ABC7-B039102F3792}" type="slidenum">
+              <a:rPr lang="fr-FR" noProof="0" smtClean="0"/>
+              <a:t>2</a:t>
+            </a:fld>
+            <a:endParaRPr lang="fr-FR" noProof="0" dirty="0"/>
+          </a:p>
+        </p:txBody>
+      </p:sp>
     </p:spTree>
     <p:extLst>
       <p:ext uri="{BB962C8B-B14F-4D97-AF65-F5344CB8AC3E}">
@@ -18389,13 +19321,13 @@
           <p:nvPr>
             <p:extLst>
               <p:ext uri="{D42A27DB-BD31-4B8C-83A1-F6EECF244321}">
-                <p14:modId xmlns:p14="http://schemas.microsoft.com/office/powerpoint/2010/main" val="4132913405"/>
+                <p14:modId xmlns:p14="http://schemas.microsoft.com/office/powerpoint/2010/main" val="702357477"/>
               </p:ext>
             </p:extLst>
           </p:nvPr>
         </p:nvGraphicFramePr>
         <p:xfrm>
-          <a:off x="2032000" y="1164283"/>
+          <a:off x="2032000" y="1013281"/>
           <a:ext cx="8128000" cy="5418667"/>
         </p:xfrm>
         <a:graphic>
@@ -18404,6 +19336,206 @@
           </a:graphicData>
         </a:graphic>
       </p:graphicFrame>
+      <p:sp>
+        <p:nvSpPr>
+          <p:cNvPr id="2" name="Espace réservé du pied de page 1">
+            <a:extLst>
+              <a:ext uri="{FF2B5EF4-FFF2-40B4-BE49-F238E27FC236}">
+                <a16:creationId xmlns:a16="http://schemas.microsoft.com/office/drawing/2014/main" id="{140844FA-3D7D-44BF-A1A3-E4A0511E4A94}"/>
+              </a:ext>
+            </a:extLst>
+          </p:cNvPr>
+          <p:cNvSpPr>
+            <a:spLocks noGrp="1"/>
+          </p:cNvSpPr>
+          <p:nvPr>
+            <p:ph type="ftr" sz="quarter" idx="11"/>
+          </p:nvPr>
+        </p:nvSpPr>
+        <p:spPr/>
+        <p:txBody>
+          <a:bodyPr/>
+          <a:lstStyle/>
+          <a:p>
+            <a:pPr rtl="0"/>
+            <a:r>
+              <a:rPr lang="fr-FR" noProof="0"/>
+              <a:t>Data challenge – Bankable customers</a:t>
+            </a:r>
+            <a:endParaRPr lang="fr-FR" noProof="0" dirty="0"/>
+          </a:p>
+        </p:txBody>
+      </p:sp>
+      <p:sp>
+        <p:nvSpPr>
+          <p:cNvPr id="5" name="Espace réservé du numéro de diapositive 4">
+            <a:extLst>
+              <a:ext uri="{FF2B5EF4-FFF2-40B4-BE49-F238E27FC236}">
+                <a16:creationId xmlns:a16="http://schemas.microsoft.com/office/drawing/2014/main" id="{20072B52-78F6-44F8-81A4-1865E5B83408}"/>
+              </a:ext>
+            </a:extLst>
+          </p:cNvPr>
+          <p:cNvSpPr>
+            <a:spLocks noGrp="1"/>
+          </p:cNvSpPr>
+          <p:nvPr>
+            <p:ph type="sldNum" sz="quarter" idx="12"/>
+          </p:nvPr>
+        </p:nvSpPr>
+        <p:spPr/>
+        <p:txBody>
+          <a:bodyPr/>
+          <a:lstStyle/>
+          <a:p>
+            <a:pPr rtl="0"/>
+            <a:fld id="{06FEDF93-2BFD-41CA-ABC7-B039102F3792}" type="slidenum">
+              <a:rPr lang="fr-FR" noProof="0" smtClean="0"/>
+              <a:t>4</a:t>
+            </a:fld>
+            <a:endParaRPr lang="fr-FR" noProof="0" dirty="0"/>
+          </a:p>
+        </p:txBody>
+      </p:sp>
+      <p:sp>
+        <p:nvSpPr>
+          <p:cNvPr id="6" name="ZoneTexte 5">
+            <a:extLst>
+              <a:ext uri="{FF2B5EF4-FFF2-40B4-BE49-F238E27FC236}">
+                <a16:creationId xmlns:a16="http://schemas.microsoft.com/office/drawing/2014/main" id="{15BDC36D-18D6-4DF7-B7BF-6009CD3A9292}"/>
+              </a:ext>
+            </a:extLst>
+          </p:cNvPr>
+          <p:cNvSpPr txBox="1"/>
+          <p:nvPr/>
+        </p:nvSpPr>
+        <p:spPr>
+          <a:xfrm>
+            <a:off x="2097248" y="3429000"/>
+            <a:ext cx="266420" cy="369332"/>
+          </a:xfrm>
+          <a:prstGeom prst="rect">
+            <a:avLst/>
+          </a:prstGeom>
+          <a:noFill/>
+        </p:spPr>
+        <p:txBody>
+          <a:bodyPr wrap="none" rtlCol="0">
+            <a:spAutoFit/>
+          </a:bodyPr>
+          <a:lstStyle/>
+          <a:p>
+            <a:r>
+              <a:rPr lang="fr-FR" dirty="0"/>
+              <a:t>1</a:t>
+            </a:r>
+          </a:p>
+        </p:txBody>
+      </p:sp>
+      <p:sp>
+        <p:nvSpPr>
+          <p:cNvPr id="12" name="ZoneTexte 11">
+            <a:extLst>
+              <a:ext uri="{FF2B5EF4-FFF2-40B4-BE49-F238E27FC236}">
+                <a16:creationId xmlns:a16="http://schemas.microsoft.com/office/drawing/2014/main" id="{DCC64419-C012-4449-B9C0-3C73D652AD92}"/>
+              </a:ext>
+            </a:extLst>
+          </p:cNvPr>
+          <p:cNvSpPr txBox="1"/>
+          <p:nvPr/>
+        </p:nvSpPr>
+        <p:spPr>
+          <a:xfrm>
+            <a:off x="3801611" y="1382385"/>
+            <a:ext cx="303288" cy="369332"/>
+          </a:xfrm>
+          <a:prstGeom prst="rect">
+            <a:avLst/>
+          </a:prstGeom>
+          <a:noFill/>
+        </p:spPr>
+        <p:txBody>
+          <a:bodyPr wrap="none" rtlCol="0">
+            <a:spAutoFit/>
+          </a:bodyPr>
+          <a:lstStyle/>
+          <a:p>
+            <a:r>
+              <a:rPr lang="fr-FR" dirty="0"/>
+              <a:t>2</a:t>
+            </a:r>
+          </a:p>
+        </p:txBody>
+      </p:sp>
+      <p:sp>
+        <p:nvSpPr>
+          <p:cNvPr id="13" name="ZoneTexte 12">
+            <a:extLst>
+              <a:ext uri="{FF2B5EF4-FFF2-40B4-BE49-F238E27FC236}">
+                <a16:creationId xmlns:a16="http://schemas.microsoft.com/office/drawing/2014/main" id="{75AECFC6-2CCD-4799-8994-CF01113332D3}"/>
+              </a:ext>
+            </a:extLst>
+          </p:cNvPr>
+          <p:cNvSpPr txBox="1"/>
+          <p:nvPr/>
+        </p:nvSpPr>
+        <p:spPr>
+          <a:xfrm>
+            <a:off x="6434356" y="1382385"/>
+            <a:ext cx="303288" cy="369332"/>
+          </a:xfrm>
+          <a:prstGeom prst="rect">
+            <a:avLst/>
+          </a:prstGeom>
+          <a:noFill/>
+        </p:spPr>
+        <p:txBody>
+          <a:bodyPr wrap="none" rtlCol="0">
+            <a:spAutoFit/>
+          </a:bodyPr>
+          <a:lstStyle/>
+          <a:p>
+            <a:r>
+              <a:rPr lang="fr-FR" dirty="0"/>
+              <a:t>3</a:t>
+            </a:r>
+          </a:p>
+        </p:txBody>
+      </p:sp>
+      <p:sp>
+        <p:nvSpPr>
+          <p:cNvPr id="15" name="ZoneTexte 14">
+            <a:extLst>
+              <a:ext uri="{FF2B5EF4-FFF2-40B4-BE49-F238E27FC236}">
+                <a16:creationId xmlns:a16="http://schemas.microsoft.com/office/drawing/2014/main" id="{D35177ED-38EC-42D8-A268-57CC4F2043C0}"/>
+              </a:ext>
+            </a:extLst>
+          </p:cNvPr>
+          <p:cNvSpPr txBox="1"/>
+          <p:nvPr/>
+        </p:nvSpPr>
+        <p:spPr>
+          <a:xfrm>
+            <a:off x="8153400" y="3382922"/>
+            <a:ext cx="306494" cy="369332"/>
+          </a:xfrm>
+          <a:prstGeom prst="rect">
+            <a:avLst/>
+          </a:prstGeom>
+          <a:noFill/>
+        </p:spPr>
+        <p:txBody>
+          <a:bodyPr wrap="none" rtlCol="0">
+            <a:spAutoFit/>
+          </a:bodyPr>
+          <a:lstStyle/>
+          <a:p>
+            <a:r>
+              <a:rPr lang="fr-FR" dirty="0"/>
+              <a:t>4</a:t>
+            </a:r>
+          </a:p>
+        </p:txBody>
+      </p:sp>
     </p:spTree>
     <p:extLst>
       <p:ext uri="{BB962C8B-B14F-4D97-AF65-F5344CB8AC3E}">
@@ -18858,6 +19990,66 @@
                 </a:schemeClr>
               </a:solidFill>
             </a:endParaRPr>
+          </a:p>
+        </p:txBody>
+      </p:sp>
+      <p:sp>
+        <p:nvSpPr>
+          <p:cNvPr id="3" name="Espace réservé du pied de page 2">
+            <a:extLst>
+              <a:ext uri="{FF2B5EF4-FFF2-40B4-BE49-F238E27FC236}">
+                <a16:creationId xmlns:a16="http://schemas.microsoft.com/office/drawing/2014/main" id="{5536BD5E-798A-458D-A75B-E13C0D1EDE3F}"/>
+              </a:ext>
+            </a:extLst>
+          </p:cNvPr>
+          <p:cNvSpPr>
+            <a:spLocks noGrp="1"/>
+          </p:cNvSpPr>
+          <p:nvPr>
+            <p:ph type="ftr" sz="quarter" idx="11"/>
+          </p:nvPr>
+        </p:nvSpPr>
+        <p:spPr/>
+        <p:txBody>
+          <a:bodyPr/>
+          <a:lstStyle/>
+          <a:p>
+            <a:pPr rtl="0"/>
+            <a:r>
+              <a:rPr lang="fr-FR" noProof="0"/>
+              <a:t>Data challenge – Bankable customers</a:t>
+            </a:r>
+            <a:endParaRPr lang="fr-FR" noProof="0" dirty="0"/>
+          </a:p>
+        </p:txBody>
+      </p:sp>
+      <p:sp>
+        <p:nvSpPr>
+          <p:cNvPr id="5" name="Espace réservé du numéro de diapositive 4">
+            <a:extLst>
+              <a:ext uri="{FF2B5EF4-FFF2-40B4-BE49-F238E27FC236}">
+                <a16:creationId xmlns:a16="http://schemas.microsoft.com/office/drawing/2014/main" id="{1996CBA4-8054-428C-A6B6-DFFAD14C8DEA}"/>
+              </a:ext>
+            </a:extLst>
+          </p:cNvPr>
+          <p:cNvSpPr>
+            <a:spLocks noGrp="1"/>
+          </p:cNvSpPr>
+          <p:nvPr>
+            <p:ph type="sldNum" sz="quarter" idx="12"/>
+          </p:nvPr>
+        </p:nvSpPr>
+        <p:spPr/>
+        <p:txBody>
+          <a:bodyPr/>
+          <a:lstStyle/>
+          <a:p>
+            <a:pPr rtl="0"/>
+            <a:fld id="{06FEDF93-2BFD-41CA-ABC7-B039102F3792}" type="slidenum">
+              <a:rPr lang="fr-FR" noProof="0" smtClean="0"/>
+              <a:t>5</a:t>
+            </a:fld>
+            <a:endParaRPr lang="fr-FR" noProof="0" dirty="0"/>
           </a:p>
         </p:txBody>
       </p:sp>
@@ -19445,6 +20637,66 @@
               <a:latin typeface="Calibri" panose="020F0502020204030204" pitchFamily="34" charset="0"/>
               <a:cs typeface="Calibri" panose="020F0502020204030204" pitchFamily="34" charset="0"/>
             </a:endParaRPr>
+          </a:p>
+        </p:txBody>
+      </p:sp>
+      <p:sp>
+        <p:nvSpPr>
+          <p:cNvPr id="2" name="Espace réservé du pied de page 1">
+            <a:extLst>
+              <a:ext uri="{FF2B5EF4-FFF2-40B4-BE49-F238E27FC236}">
+                <a16:creationId xmlns:a16="http://schemas.microsoft.com/office/drawing/2014/main" id="{36F93FF7-E5BB-4D73-BCB9-DAC5AB8F0A8B}"/>
+              </a:ext>
+            </a:extLst>
+          </p:cNvPr>
+          <p:cNvSpPr>
+            <a:spLocks noGrp="1"/>
+          </p:cNvSpPr>
+          <p:nvPr>
+            <p:ph type="ftr" sz="quarter" idx="11"/>
+          </p:nvPr>
+        </p:nvSpPr>
+        <p:spPr/>
+        <p:txBody>
+          <a:bodyPr/>
+          <a:lstStyle/>
+          <a:p>
+            <a:pPr rtl="0"/>
+            <a:r>
+              <a:rPr lang="fr-FR" noProof="0"/>
+              <a:t>Data challenge – Bankable customers</a:t>
+            </a:r>
+            <a:endParaRPr lang="fr-FR" noProof="0" dirty="0"/>
+          </a:p>
+        </p:txBody>
+      </p:sp>
+      <p:sp>
+        <p:nvSpPr>
+          <p:cNvPr id="3" name="Espace réservé du numéro de diapositive 2">
+            <a:extLst>
+              <a:ext uri="{FF2B5EF4-FFF2-40B4-BE49-F238E27FC236}">
+                <a16:creationId xmlns:a16="http://schemas.microsoft.com/office/drawing/2014/main" id="{969B0C86-FEEA-4FAC-9073-8E0503A3E004}"/>
+              </a:ext>
+            </a:extLst>
+          </p:cNvPr>
+          <p:cNvSpPr>
+            <a:spLocks noGrp="1"/>
+          </p:cNvSpPr>
+          <p:nvPr>
+            <p:ph type="sldNum" sz="quarter" idx="12"/>
+          </p:nvPr>
+        </p:nvSpPr>
+        <p:spPr/>
+        <p:txBody>
+          <a:bodyPr/>
+          <a:lstStyle/>
+          <a:p>
+            <a:pPr rtl="0"/>
+            <a:fld id="{06FEDF93-2BFD-41CA-ABC7-B039102F3792}" type="slidenum">
+              <a:rPr lang="fr-FR" noProof="0" smtClean="0"/>
+              <a:t>6</a:t>
+            </a:fld>
+            <a:endParaRPr lang="fr-FR" noProof="0" dirty="0"/>
           </a:p>
         </p:txBody>
       </p:sp>
@@ -20020,6 +21272,66 @@
           </a:prstGeom>
         </p:spPr>
       </p:pic>
+      <p:sp>
+        <p:nvSpPr>
+          <p:cNvPr id="2" name="Espace réservé du pied de page 1">
+            <a:extLst>
+              <a:ext uri="{FF2B5EF4-FFF2-40B4-BE49-F238E27FC236}">
+                <a16:creationId xmlns:a16="http://schemas.microsoft.com/office/drawing/2014/main" id="{921A81D5-7139-4ADD-9946-FD5DDF2E5F02}"/>
+              </a:ext>
+            </a:extLst>
+          </p:cNvPr>
+          <p:cNvSpPr>
+            <a:spLocks noGrp="1"/>
+          </p:cNvSpPr>
+          <p:nvPr>
+            <p:ph type="ftr" sz="quarter" idx="11"/>
+          </p:nvPr>
+        </p:nvSpPr>
+        <p:spPr/>
+        <p:txBody>
+          <a:bodyPr/>
+          <a:lstStyle/>
+          <a:p>
+            <a:pPr rtl="0"/>
+            <a:r>
+              <a:rPr lang="fr-FR" noProof="0"/>
+              <a:t>Data challenge – Bankable customers</a:t>
+            </a:r>
+            <a:endParaRPr lang="fr-FR" noProof="0" dirty="0"/>
+          </a:p>
+        </p:txBody>
+      </p:sp>
+      <p:sp>
+        <p:nvSpPr>
+          <p:cNvPr id="3" name="Espace réservé du numéro de diapositive 2">
+            <a:extLst>
+              <a:ext uri="{FF2B5EF4-FFF2-40B4-BE49-F238E27FC236}">
+                <a16:creationId xmlns:a16="http://schemas.microsoft.com/office/drawing/2014/main" id="{C77981D0-66C6-4FF5-B656-801508534050}"/>
+              </a:ext>
+            </a:extLst>
+          </p:cNvPr>
+          <p:cNvSpPr>
+            <a:spLocks noGrp="1"/>
+          </p:cNvSpPr>
+          <p:nvPr>
+            <p:ph type="sldNum" sz="quarter" idx="12"/>
+          </p:nvPr>
+        </p:nvSpPr>
+        <p:spPr/>
+        <p:txBody>
+          <a:bodyPr/>
+          <a:lstStyle/>
+          <a:p>
+            <a:pPr rtl="0"/>
+            <a:fld id="{06FEDF93-2BFD-41CA-ABC7-B039102F3792}" type="slidenum">
+              <a:rPr lang="fr-FR" noProof="0" smtClean="0"/>
+              <a:t>8</a:t>
+            </a:fld>
+            <a:endParaRPr lang="fr-FR" noProof="0" dirty="0"/>
+          </a:p>
+        </p:txBody>
+      </p:sp>
     </p:spTree>
     <p:extLst>
       <p:ext uri="{BB962C8B-B14F-4D97-AF65-F5344CB8AC3E}">
@@ -20484,6 +21796,66 @@
               <a:latin typeface="Calibri" panose="020F0502020204030204" pitchFamily="34" charset="0"/>
               <a:cs typeface="Calibri" panose="020F0502020204030204" pitchFamily="34" charset="0"/>
             </a:endParaRPr>
+          </a:p>
+        </p:txBody>
+      </p:sp>
+      <p:sp>
+        <p:nvSpPr>
+          <p:cNvPr id="3" name="Espace réservé du pied de page 2">
+            <a:extLst>
+              <a:ext uri="{FF2B5EF4-FFF2-40B4-BE49-F238E27FC236}">
+                <a16:creationId xmlns:a16="http://schemas.microsoft.com/office/drawing/2014/main" id="{6AE87273-8C82-4209-A000-350EB56B931F}"/>
+              </a:ext>
+            </a:extLst>
+          </p:cNvPr>
+          <p:cNvSpPr>
+            <a:spLocks noGrp="1"/>
+          </p:cNvSpPr>
+          <p:nvPr>
+            <p:ph type="ftr" sz="quarter" idx="11"/>
+          </p:nvPr>
+        </p:nvSpPr>
+        <p:spPr/>
+        <p:txBody>
+          <a:bodyPr/>
+          <a:lstStyle/>
+          <a:p>
+            <a:pPr rtl="0"/>
+            <a:r>
+              <a:rPr lang="fr-FR" noProof="0"/>
+              <a:t>Data challenge – Bankable customers</a:t>
+            </a:r>
+            <a:endParaRPr lang="fr-FR" noProof="0" dirty="0"/>
+          </a:p>
+        </p:txBody>
+      </p:sp>
+      <p:sp>
+        <p:nvSpPr>
+          <p:cNvPr id="5" name="Espace réservé du numéro de diapositive 4">
+            <a:extLst>
+              <a:ext uri="{FF2B5EF4-FFF2-40B4-BE49-F238E27FC236}">
+                <a16:creationId xmlns:a16="http://schemas.microsoft.com/office/drawing/2014/main" id="{AA2603E6-1B57-42BD-A7A5-8B1EFC4559B7}"/>
+              </a:ext>
+            </a:extLst>
+          </p:cNvPr>
+          <p:cNvSpPr>
+            <a:spLocks noGrp="1"/>
+          </p:cNvSpPr>
+          <p:nvPr>
+            <p:ph type="sldNum" sz="quarter" idx="12"/>
+          </p:nvPr>
+        </p:nvSpPr>
+        <p:spPr/>
+        <p:txBody>
+          <a:bodyPr/>
+          <a:lstStyle/>
+          <a:p>
+            <a:pPr rtl="0"/>
+            <a:fld id="{06FEDF93-2BFD-41CA-ABC7-B039102F3792}" type="slidenum">
+              <a:rPr lang="fr-FR" noProof="0" smtClean="0"/>
+              <a:t>9</a:t>
+            </a:fld>
+            <a:endParaRPr lang="fr-FR" noProof="0" dirty="0"/>
           </a:p>
         </p:txBody>
       </p:sp>

</xml_diff>